<commit_message>
Receipts and poster update
</commit_message>
<xml_diff>
--- a/Documentation/Poster/PosterTemplate.pptx
+++ b/Documentation/Poster/PosterTemplate.pptx
@@ -192,7 +192,7 @@
           <a:p>
             <a:fld id="{9D5373D5-638A-4BA9-A8BF-BF5CF7A1CB82}" type="datetimeFigureOut">
               <a:rPr lang="en-US" smtClean="0"/>
-              <a:t>4/27/15</a:t>
+              <a:t>5/1/15</a:t>
             </a:fld>
             <a:endParaRPr lang="en-US"/>
           </a:p>
@@ -725,7 +725,7 @@
           <a:p>
             <a:fld id="{6E8BA7B0-7206-DA40-B952-23CF351FFF63}" type="datetimeFigureOut">
               <a:rPr lang="en-US" smtClean="0"/>
-              <a:t>4/27/15</a:t>
+              <a:t>5/1/15</a:t>
             </a:fld>
             <a:endParaRPr lang="en-US"/>
           </a:p>
@@ -895,7 +895,7 @@
           <a:p>
             <a:fld id="{6E8BA7B0-7206-DA40-B952-23CF351FFF63}" type="datetimeFigureOut">
               <a:rPr lang="en-US" smtClean="0"/>
-              <a:t>4/27/15</a:t>
+              <a:t>5/1/15</a:t>
             </a:fld>
             <a:endParaRPr lang="en-US"/>
           </a:p>
@@ -1075,7 +1075,7 @@
           <a:p>
             <a:fld id="{6E8BA7B0-7206-DA40-B952-23CF351FFF63}" type="datetimeFigureOut">
               <a:rPr lang="en-US" smtClean="0"/>
-              <a:t>4/27/15</a:t>
+              <a:t>5/1/15</a:t>
             </a:fld>
             <a:endParaRPr lang="en-US"/>
           </a:p>
@@ -1245,7 +1245,7 @@
           <a:p>
             <a:fld id="{6E8BA7B0-7206-DA40-B952-23CF351FFF63}" type="datetimeFigureOut">
               <a:rPr lang="en-US" smtClean="0"/>
-              <a:t>4/27/15</a:t>
+              <a:t>5/1/15</a:t>
             </a:fld>
             <a:endParaRPr lang="en-US"/>
           </a:p>
@@ -1491,7 +1491,7 @@
           <a:p>
             <a:fld id="{6E8BA7B0-7206-DA40-B952-23CF351FFF63}" type="datetimeFigureOut">
               <a:rPr lang="en-US" smtClean="0"/>
-              <a:t>4/27/15</a:t>
+              <a:t>5/1/15</a:t>
             </a:fld>
             <a:endParaRPr lang="en-US"/>
           </a:p>
@@ -1779,7 +1779,7 @@
           <a:p>
             <a:fld id="{6E8BA7B0-7206-DA40-B952-23CF351FFF63}" type="datetimeFigureOut">
               <a:rPr lang="en-US" smtClean="0"/>
-              <a:t>4/27/15</a:t>
+              <a:t>5/1/15</a:t>
             </a:fld>
             <a:endParaRPr lang="en-US"/>
           </a:p>
@@ -2201,7 +2201,7 @@
           <a:p>
             <a:fld id="{6E8BA7B0-7206-DA40-B952-23CF351FFF63}" type="datetimeFigureOut">
               <a:rPr lang="en-US" smtClean="0"/>
-              <a:t>4/27/15</a:t>
+              <a:t>5/1/15</a:t>
             </a:fld>
             <a:endParaRPr lang="en-US"/>
           </a:p>
@@ -2319,7 +2319,7 @@
           <a:p>
             <a:fld id="{6E8BA7B0-7206-DA40-B952-23CF351FFF63}" type="datetimeFigureOut">
               <a:rPr lang="en-US" smtClean="0"/>
-              <a:t>4/27/15</a:t>
+              <a:t>5/1/15</a:t>
             </a:fld>
             <a:endParaRPr lang="en-US"/>
           </a:p>
@@ -2414,7 +2414,7 @@
           <a:p>
             <a:fld id="{6E8BA7B0-7206-DA40-B952-23CF351FFF63}" type="datetimeFigureOut">
               <a:rPr lang="en-US" smtClean="0"/>
-              <a:t>4/27/15</a:t>
+              <a:t>5/1/15</a:t>
             </a:fld>
             <a:endParaRPr lang="en-US"/>
           </a:p>
@@ -2691,7 +2691,7 @@
           <a:p>
             <a:fld id="{6E8BA7B0-7206-DA40-B952-23CF351FFF63}" type="datetimeFigureOut">
               <a:rPr lang="en-US" smtClean="0"/>
-              <a:t>4/27/15</a:t>
+              <a:t>5/1/15</a:t>
             </a:fld>
             <a:endParaRPr lang="en-US"/>
           </a:p>
@@ -2944,7 +2944,7 @@
           <a:p>
             <a:fld id="{6E8BA7B0-7206-DA40-B952-23CF351FFF63}" type="datetimeFigureOut">
               <a:rPr lang="en-US" smtClean="0"/>
-              <a:t>4/27/15</a:t>
+              <a:t>5/1/15</a:t>
             </a:fld>
             <a:endParaRPr lang="en-US"/>
           </a:p>
@@ -3157,7 +3157,7 @@
           <a:p>
             <a:fld id="{6E8BA7B0-7206-DA40-B952-23CF351FFF63}" type="datetimeFigureOut">
               <a:rPr lang="en-US" smtClean="0"/>
-              <a:t>4/27/15</a:t>
+              <a:t>5/1/15</a:t>
             </a:fld>
             <a:endParaRPr lang="en-US"/>
           </a:p>
@@ -3677,7 +3677,7 @@
         <p:spPr>
           <a:xfrm>
             <a:off x="1419460" y="6181164"/>
-            <a:ext cx="11010928" cy="1200328"/>
+            <a:ext cx="11010928" cy="2554545"/>
           </a:xfrm>
           <a:prstGeom prst="rect">
             <a:avLst/>
@@ -3691,14 +3691,10 @@
           <a:lstStyle/>
           <a:p>
             <a:r>
-              <a:rPr lang="en-US" sz="2400" dirty="0" smtClean="0"/>
-              <a:t>The Viking Motorsports team could’ve chosen a number of different </a:t>
-            </a:r>
-            <a:r>
-              <a:rPr lang="en-US" sz="2400" dirty="0" smtClean="0"/>
-              <a:t>solutions for their digital dash. All of these solutions came at the expense of cost and would not be a custom fit for their vehicle.</a:t>
-            </a:r>
-            <a:endParaRPr lang="en-US" sz="2400" dirty="0"/>
+              <a:rPr lang="en-US" sz="4000" dirty="0" smtClean="0"/>
+              <a:t>The Viking Motorsports team could’ve chosen a number of different solutions for their digital dash. All of these solutions came at the expense of cost and would not be a custom fit for their vehicle.</a:t>
+            </a:r>
+            <a:endParaRPr lang="en-US" sz="4000" dirty="0"/>
           </a:p>
         </p:txBody>
       </p:sp>
@@ -4622,6 +4618,40 @@
             <a:r>
               <a:rPr lang="en-US" sz="2400" smtClean="0"/>
               <a:t>mod wires”.</a:t>
+            </a:r>
+            <a:endParaRPr lang="en-US" sz="2400" dirty="0"/>
+          </a:p>
+        </p:txBody>
+      </p:sp>
+      <p:sp>
+        <p:nvSpPr>
+          <p:cNvPr id="12" name="TextBox 11"/>
+          <p:cNvSpPr txBox="1"/>
+          <p:nvPr/>
+        </p:nvSpPr>
+        <p:spPr>
+          <a:xfrm>
+            <a:off x="30623080" y="16109421"/>
+            <a:ext cx="7585430" cy="461665"/>
+          </a:xfrm>
+          <a:prstGeom prst="rect">
+            <a:avLst/>
+          </a:prstGeom>
+          <a:noFill/>
+        </p:spPr>
+        <p:txBody>
+          <a:bodyPr wrap="none" rtlCol="0">
+            <a:spAutoFit/>
+          </a:bodyPr>
+          <a:lstStyle/>
+          <a:p>
+            <a:r>
+              <a:rPr lang="en-US" sz="2400" dirty="0" smtClean="0"/>
+              <a:t>The digital dash can be installed on the VMS </a:t>
+            </a:r>
+            <a:r>
+              <a:rPr lang="en-US" sz="2400" smtClean="0"/>
+              <a:t>car if it works.</a:t>
             </a:r>
             <a:endParaRPr lang="en-US" sz="2400" dirty="0"/>
           </a:p>

</xml_diff>

<commit_message>
Poster update, COMMIT 199!!!
</commit_message>
<xml_diff>
--- a/Documentation/Poster/PosterTemplate.pptx
+++ b/Documentation/Poster/PosterTemplate.pptx
@@ -192,7 +192,7 @@
           <a:p>
             <a:fld id="{9D5373D5-638A-4BA9-A8BF-BF5CF7A1CB82}" type="datetimeFigureOut">
               <a:rPr lang="en-US" smtClean="0"/>
-              <a:t>5/1/15</a:t>
+              <a:t>5/15/15</a:t>
             </a:fld>
             <a:endParaRPr lang="en-US"/>
           </a:p>
@@ -725,7 +725,7 @@
           <a:p>
             <a:fld id="{6E8BA7B0-7206-DA40-B952-23CF351FFF63}" type="datetimeFigureOut">
               <a:rPr lang="en-US" smtClean="0"/>
-              <a:t>5/1/15</a:t>
+              <a:t>5/15/15</a:t>
             </a:fld>
             <a:endParaRPr lang="en-US"/>
           </a:p>
@@ -895,7 +895,7 @@
           <a:p>
             <a:fld id="{6E8BA7B0-7206-DA40-B952-23CF351FFF63}" type="datetimeFigureOut">
               <a:rPr lang="en-US" smtClean="0"/>
-              <a:t>5/1/15</a:t>
+              <a:t>5/15/15</a:t>
             </a:fld>
             <a:endParaRPr lang="en-US"/>
           </a:p>
@@ -1075,7 +1075,7 @@
           <a:p>
             <a:fld id="{6E8BA7B0-7206-DA40-B952-23CF351FFF63}" type="datetimeFigureOut">
               <a:rPr lang="en-US" smtClean="0"/>
-              <a:t>5/1/15</a:t>
+              <a:t>5/15/15</a:t>
             </a:fld>
             <a:endParaRPr lang="en-US"/>
           </a:p>
@@ -1245,7 +1245,7 @@
           <a:p>
             <a:fld id="{6E8BA7B0-7206-DA40-B952-23CF351FFF63}" type="datetimeFigureOut">
               <a:rPr lang="en-US" smtClean="0"/>
-              <a:t>5/1/15</a:t>
+              <a:t>5/15/15</a:t>
             </a:fld>
             <a:endParaRPr lang="en-US"/>
           </a:p>
@@ -1491,7 +1491,7 @@
           <a:p>
             <a:fld id="{6E8BA7B0-7206-DA40-B952-23CF351FFF63}" type="datetimeFigureOut">
               <a:rPr lang="en-US" smtClean="0"/>
-              <a:t>5/1/15</a:t>
+              <a:t>5/15/15</a:t>
             </a:fld>
             <a:endParaRPr lang="en-US"/>
           </a:p>
@@ -1779,7 +1779,7 @@
           <a:p>
             <a:fld id="{6E8BA7B0-7206-DA40-B952-23CF351FFF63}" type="datetimeFigureOut">
               <a:rPr lang="en-US" smtClean="0"/>
-              <a:t>5/1/15</a:t>
+              <a:t>5/15/15</a:t>
             </a:fld>
             <a:endParaRPr lang="en-US"/>
           </a:p>
@@ -2201,7 +2201,7 @@
           <a:p>
             <a:fld id="{6E8BA7B0-7206-DA40-B952-23CF351FFF63}" type="datetimeFigureOut">
               <a:rPr lang="en-US" smtClean="0"/>
-              <a:t>5/1/15</a:t>
+              <a:t>5/15/15</a:t>
             </a:fld>
             <a:endParaRPr lang="en-US"/>
           </a:p>
@@ -2319,7 +2319,7 @@
           <a:p>
             <a:fld id="{6E8BA7B0-7206-DA40-B952-23CF351FFF63}" type="datetimeFigureOut">
               <a:rPr lang="en-US" smtClean="0"/>
-              <a:t>5/1/15</a:t>
+              <a:t>5/15/15</a:t>
             </a:fld>
             <a:endParaRPr lang="en-US"/>
           </a:p>
@@ -2414,7 +2414,7 @@
           <a:p>
             <a:fld id="{6E8BA7B0-7206-DA40-B952-23CF351FFF63}" type="datetimeFigureOut">
               <a:rPr lang="en-US" smtClean="0"/>
-              <a:t>5/1/15</a:t>
+              <a:t>5/15/15</a:t>
             </a:fld>
             <a:endParaRPr lang="en-US"/>
           </a:p>
@@ -2691,7 +2691,7 @@
           <a:p>
             <a:fld id="{6E8BA7B0-7206-DA40-B952-23CF351FFF63}" type="datetimeFigureOut">
               <a:rPr lang="en-US" smtClean="0"/>
-              <a:t>5/1/15</a:t>
+              <a:t>5/15/15</a:t>
             </a:fld>
             <a:endParaRPr lang="en-US"/>
           </a:p>
@@ -2944,7 +2944,7 @@
           <a:p>
             <a:fld id="{6E8BA7B0-7206-DA40-B952-23CF351FFF63}" type="datetimeFigureOut">
               <a:rPr lang="en-US" smtClean="0"/>
-              <a:t>5/1/15</a:t>
+              <a:t>5/15/15</a:t>
             </a:fld>
             <a:endParaRPr lang="en-US"/>
           </a:p>
@@ -3157,7 +3157,7 @@
           <a:p>
             <a:fld id="{6E8BA7B0-7206-DA40-B952-23CF351FFF63}" type="datetimeFigureOut">
               <a:rPr lang="en-US" smtClean="0"/>
-              <a:t>5/1/15</a:t>
+              <a:t>5/15/15</a:t>
             </a:fld>
             <a:endParaRPr lang="en-US"/>
           </a:p>
@@ -3591,7 +3591,7 @@
         <p:spPr>
           <a:xfrm>
             <a:off x="486195" y="3912067"/>
-            <a:ext cx="13334863" cy="9143533"/>
+            <a:ext cx="13334863" cy="9372133"/>
           </a:xfrm>
           <a:prstGeom prst="roundRect">
             <a:avLst/>
@@ -3795,7 +3795,7 @@
         <p:spPr>
           <a:xfrm>
             <a:off x="29840848" y="14325600"/>
-            <a:ext cx="13334863" cy="7162800"/>
+            <a:ext cx="13334863" cy="7696200"/>
           </a:xfrm>
           <a:prstGeom prst="roundRect">
             <a:avLst/>
@@ -4041,7 +4041,7 @@
         </p:nvSpPr>
         <p:spPr>
           <a:xfrm>
-            <a:off x="1419460" y="15501054"/>
+            <a:off x="1266808" y="25407054"/>
             <a:ext cx="4790840" cy="5632311"/>
           </a:xfrm>
           <a:prstGeom prst="rect">
@@ -4122,8 +4122,8 @@
         </p:nvSpPr>
         <p:spPr>
           <a:xfrm>
-            <a:off x="33700756" y="4415664"/>
-            <a:ext cx="5071385" cy="1366528"/>
+            <a:off x="32363297" y="4437128"/>
+            <a:ext cx="8456171" cy="1366528"/>
           </a:xfrm>
           <a:prstGeom prst="rect">
             <a:avLst/>
@@ -4144,7 +4144,7 @@
                 <a:latin typeface="BlairMdITC TT-Medium"/>
                 <a:cs typeface="BlairMdITC TT-Medium"/>
               </a:rPr>
-              <a:t>Testing</a:t>
+              <a:t>Performance</a:t>
             </a:r>
             <a:endParaRPr lang="en-US" dirty="0">
               <a:solidFill>
@@ -4248,8 +4248,8 @@
         </p:nvSpPr>
         <p:spPr>
           <a:xfrm>
-            <a:off x="2558076" y="23746464"/>
-            <a:ext cx="9175608" cy="1366528"/>
+            <a:off x="4082076" y="23746464"/>
+            <a:ext cx="5872385" cy="1366528"/>
           </a:xfrm>
           <a:prstGeom prst="rect">
             <a:avLst/>
@@ -4270,7 +4270,7 @@
                 <a:latin typeface="BlairMdITC TT-Medium"/>
                 <a:cs typeface="BlairMdITC TT-Medium"/>
               </a:rPr>
-              <a:t>Block Diagram</a:t>
+              <a:t>Solution</a:t>
             </a:r>
             <a:endParaRPr lang="en-US" dirty="0">
               <a:solidFill>
@@ -4451,13 +4451,13 @@
       </p:pic>
       <p:pic>
         <p:nvPicPr>
-          <p:cNvPr id="4" name="Picture 3" descr="blockdiagram.png"/>
+          <p:cNvPr id="6" name="Picture 5" descr="Top.png"/>
           <p:cNvPicPr>
             <a:picLocks noChangeAspect="1"/>
           </p:cNvPicPr>
           <p:nvPr/>
         </p:nvPicPr>
-        <p:blipFill rotWithShape="1">
+        <p:blipFill>
           <a:blip r:embed="rId7">
             <a:extLst>
               <a:ext uri="{28A0092B-C50C-407E-A947-70E740481C1C}">
@@ -4465,13 +4465,14 @@
               </a:ext>
             </a:extLst>
           </a:blip>
-          <a:srcRect b="7417"/>
-          <a:stretch/>
+          <a:stretch>
+            <a:fillRect/>
+          </a:stretch>
         </p:blipFill>
         <p:spPr>
           <a:xfrm>
-            <a:off x="1419460" y="25112992"/>
-            <a:ext cx="6863639" cy="5135568"/>
+            <a:off x="21936035" y="12969640"/>
+            <a:ext cx="6350000" cy="4165601"/>
           </a:xfrm>
           <a:prstGeom prst="rect">
             <a:avLst/>
@@ -4480,7 +4481,7 @@
       </p:pic>
       <p:pic>
         <p:nvPicPr>
-          <p:cNvPr id="6" name="Picture 5" descr="Top.png"/>
+          <p:cNvPr id="10" name="Picture 9" descr="ArduinoDue_Front.jpg"/>
           <p:cNvPicPr>
             <a:picLocks noChangeAspect="1"/>
           </p:cNvPicPr>
@@ -4500,17 +4501,286 @@
         </p:blipFill>
         <p:spPr>
           <a:xfrm>
-            <a:off x="21936035" y="5629792"/>
-            <a:ext cx="6350000" cy="4165600"/>
+            <a:off x="20373258" y="17513277"/>
+            <a:ext cx="8089901" cy="4114800"/>
           </a:xfrm>
           <a:prstGeom prst="rect">
             <a:avLst/>
           </a:prstGeom>
         </p:spPr>
       </p:pic>
+      <p:sp>
+        <p:nvSpPr>
+          <p:cNvPr id="23" name="TextBox 22"/>
+          <p:cNvSpPr txBox="1"/>
+          <p:nvPr/>
+        </p:nvSpPr>
+        <p:spPr>
+          <a:xfrm>
+            <a:off x="14874134" y="12630494"/>
+            <a:ext cx="6907908" cy="5262979"/>
+          </a:xfrm>
+          <a:prstGeom prst="rect">
+            <a:avLst/>
+          </a:prstGeom>
+          <a:noFill/>
+        </p:spPr>
+        <p:txBody>
+          <a:bodyPr wrap="square" rtlCol="0">
+            <a:spAutoFit/>
+          </a:bodyPr>
+          <a:lstStyle/>
+          <a:p>
+            <a:pPr algn="just"/>
+            <a:r>
+              <a:rPr lang="en-US" sz="2400" dirty="0" smtClean="0"/>
+              <a:t>The real estate that the digital dash unit took up on the physical dash needed to be minimal. This requirement dictated two large design choices:</a:t>
+            </a:r>
+          </a:p>
+          <a:p>
+            <a:pPr marL="342900" indent="-342900" algn="just">
+              <a:buFont typeface="Arial"/>
+              <a:buChar char="•"/>
+            </a:pPr>
+            <a:r>
+              <a:rPr lang="en-US" sz="2400" dirty="0" smtClean="0"/>
+              <a:t>The 3.5” Display Size</a:t>
+            </a:r>
+          </a:p>
+          <a:p>
+            <a:pPr marL="342900" indent="-342900" algn="just">
+              <a:buFont typeface="Arial"/>
+              <a:buChar char="•"/>
+            </a:pPr>
+            <a:r>
+              <a:rPr lang="en-US" sz="2400" dirty="0" smtClean="0"/>
+              <a:t>The custom PCB to cut down size</a:t>
+            </a:r>
+          </a:p>
+          <a:p>
+            <a:pPr marL="342900" indent="-342900" algn="just">
+              <a:buFont typeface="Arial"/>
+              <a:buChar char="•"/>
+            </a:pPr>
+            <a:endParaRPr lang="en-US" sz="2400" dirty="0"/>
+          </a:p>
+          <a:p>
+            <a:pPr algn="just"/>
+            <a:r>
+              <a:rPr lang="en-US" sz="2400" dirty="0" smtClean="0"/>
+              <a:t>The entire system was first prototyped using an </a:t>
+            </a:r>
+            <a:r>
+              <a:rPr lang="en-US" sz="2400" dirty="0" err="1" smtClean="0"/>
+              <a:t>Arduino</a:t>
+            </a:r>
+            <a:r>
+              <a:rPr lang="en-US" sz="2400" dirty="0" smtClean="0"/>
+              <a:t> Due which was slightly too large for the solution we had in mind. The screen was slightly smaller than the LCD and the </a:t>
+            </a:r>
+            <a:r>
+              <a:rPr lang="en-US" sz="2400" dirty="0" err="1" smtClean="0"/>
+              <a:t>Arduino</a:t>
+            </a:r>
+            <a:r>
+              <a:rPr lang="en-US" sz="2400" dirty="0" smtClean="0"/>
+              <a:t> Due would have a lot of wires plugging into the screen. We wanted our device to be as plug-and-play as possible so we created a custom PCB that would plug directly into the LCD with no “mod wires”.</a:t>
+            </a:r>
+            <a:endParaRPr lang="en-US" sz="2400" dirty="0"/>
+          </a:p>
+        </p:txBody>
+      </p:sp>
+      <p:sp>
+        <p:nvSpPr>
+          <p:cNvPr id="12" name="TextBox 11"/>
+          <p:cNvSpPr txBox="1"/>
+          <p:nvPr/>
+        </p:nvSpPr>
+        <p:spPr>
+          <a:xfrm>
+            <a:off x="30623080" y="16109421"/>
+            <a:ext cx="7585430" cy="461665"/>
+          </a:xfrm>
+          <a:prstGeom prst="rect">
+            <a:avLst/>
+          </a:prstGeom>
+          <a:noFill/>
+        </p:spPr>
+        <p:txBody>
+          <a:bodyPr wrap="none" rtlCol="0">
+            <a:spAutoFit/>
+          </a:bodyPr>
+          <a:lstStyle/>
+          <a:p>
+            <a:r>
+              <a:rPr lang="en-US" sz="2400" dirty="0" smtClean="0"/>
+              <a:t>The digital dash can be installed on the VMS </a:t>
+            </a:r>
+            <a:r>
+              <a:rPr lang="en-US" sz="2400" smtClean="0"/>
+              <a:t>car if it works.</a:t>
+            </a:r>
+            <a:endParaRPr lang="en-US" sz="2400" dirty="0"/>
+          </a:p>
+        </p:txBody>
+      </p:sp>
+      <p:sp>
+        <p:nvSpPr>
+          <p:cNvPr id="7" name="TextBox 6"/>
+          <p:cNvSpPr txBox="1"/>
+          <p:nvPr/>
+        </p:nvSpPr>
+        <p:spPr>
+          <a:xfrm>
+            <a:off x="15470638" y="11736390"/>
+            <a:ext cx="4313327" cy="769441"/>
+          </a:xfrm>
+          <a:prstGeom prst="rect">
+            <a:avLst/>
+          </a:prstGeom>
+          <a:noFill/>
+        </p:spPr>
+        <p:txBody>
+          <a:bodyPr wrap="none" rtlCol="0">
+            <a:spAutoFit/>
+          </a:bodyPr>
+          <a:lstStyle/>
+          <a:p>
+            <a:r>
+              <a:rPr lang="en-US" sz="4400" dirty="0" smtClean="0">
+                <a:latin typeface="BlairMdITC TT-Medium"/>
+                <a:cs typeface="BlairMdITC TT-Medium"/>
+              </a:rPr>
+              <a:t>Hardware</a:t>
+            </a:r>
+            <a:endParaRPr lang="en-US" sz="8000" dirty="0">
+              <a:latin typeface="BlairMdITC TT-Medium"/>
+              <a:cs typeface="BlairMdITC TT-Medium"/>
+            </a:endParaRPr>
+          </a:p>
+        </p:txBody>
+      </p:sp>
+      <p:sp>
+        <p:nvSpPr>
+          <p:cNvPr id="22" name="TextBox 21"/>
+          <p:cNvSpPr txBox="1"/>
+          <p:nvPr/>
+        </p:nvSpPr>
+        <p:spPr>
+          <a:xfrm>
+            <a:off x="15519400" y="21234400"/>
+            <a:ext cx="4138409" cy="769441"/>
+          </a:xfrm>
+          <a:prstGeom prst="rect">
+            <a:avLst/>
+          </a:prstGeom>
+          <a:noFill/>
+        </p:spPr>
+        <p:txBody>
+          <a:bodyPr wrap="none" rtlCol="0">
+            <a:spAutoFit/>
+          </a:bodyPr>
+          <a:lstStyle/>
+          <a:p>
+            <a:r>
+              <a:rPr lang="en-US" sz="4400" dirty="0" smtClean="0">
+                <a:latin typeface="BlairMdITC TT-Medium"/>
+                <a:cs typeface="BlairMdITC TT-Medium"/>
+              </a:rPr>
+              <a:t>Software</a:t>
+            </a:r>
+            <a:endParaRPr lang="en-US" sz="4400" dirty="0">
+              <a:latin typeface="BlairMdITC TT-Medium"/>
+              <a:cs typeface="BlairMdITC TT-Medium"/>
+            </a:endParaRPr>
+          </a:p>
+        </p:txBody>
+      </p:sp>
+      <p:sp>
+        <p:nvSpPr>
+          <p:cNvPr id="31" name="TextBox 30"/>
+          <p:cNvSpPr txBox="1"/>
+          <p:nvPr/>
+        </p:nvSpPr>
+        <p:spPr>
+          <a:xfrm>
+            <a:off x="15332406" y="22220535"/>
+            <a:ext cx="13130753" cy="1569660"/>
+          </a:xfrm>
+          <a:prstGeom prst="rect">
+            <a:avLst/>
+          </a:prstGeom>
+          <a:noFill/>
+        </p:spPr>
+        <p:txBody>
+          <a:bodyPr wrap="square" rtlCol="0">
+            <a:spAutoFit/>
+          </a:bodyPr>
+          <a:lstStyle/>
+          <a:p>
+            <a:r>
+              <a:rPr lang="en-US" sz="2400" dirty="0" smtClean="0"/>
+              <a:t>The software portion of the digital dash was created using the </a:t>
+            </a:r>
+            <a:r>
+              <a:rPr lang="en-US" sz="2400" dirty="0" err="1" smtClean="0"/>
+              <a:t>Arduino</a:t>
+            </a:r>
+            <a:r>
+              <a:rPr lang="en-US" sz="2400" dirty="0" smtClean="0"/>
+              <a:t> IDE. In order to interface with the CAN bus and the 4D systems screen the use of two separate </a:t>
+            </a:r>
+            <a:r>
+              <a:rPr lang="en-US" sz="2400" dirty="0" err="1" smtClean="0"/>
+              <a:t>Arduino</a:t>
+            </a:r>
+            <a:r>
+              <a:rPr lang="en-US" sz="2400" dirty="0" smtClean="0"/>
+              <a:t> libraries were used. The software sniffs the CAN bus looking for pertinent CAN messages and scales them to their correct values and sends the data to the screen.</a:t>
+            </a:r>
+            <a:endParaRPr lang="en-US" sz="2400" dirty="0"/>
+          </a:p>
+        </p:txBody>
+      </p:sp>
+      <p:sp>
+        <p:nvSpPr>
+          <p:cNvPr id="34" name="TextBox 33"/>
+          <p:cNvSpPr txBox="1"/>
+          <p:nvPr/>
+        </p:nvSpPr>
+        <p:spPr>
+          <a:xfrm>
+            <a:off x="15519400" y="24917400"/>
+            <a:ext cx="3174102" cy="769441"/>
+          </a:xfrm>
+          <a:prstGeom prst="rect">
+            <a:avLst/>
+          </a:prstGeom>
+          <a:noFill/>
+        </p:spPr>
+        <p:txBody>
+          <a:bodyPr wrap="none" rtlCol="0">
+            <a:spAutoFit/>
+          </a:bodyPr>
+          <a:lstStyle/>
+          <a:p>
+            <a:r>
+              <a:rPr lang="en-US" sz="4400" dirty="0" smtClean="0">
+                <a:latin typeface="BlairMdITC TT-Medium"/>
+                <a:cs typeface="BlairMdITC TT-Medium"/>
+              </a:rPr>
+              <a:t>Screen</a:t>
+            </a:r>
+            <a:endParaRPr lang="en-US" sz="4400" dirty="0">
+              <a:latin typeface="BlairMdITC TT-Medium"/>
+              <a:cs typeface="BlairMdITC TT-Medium"/>
+            </a:endParaRPr>
+          </a:p>
+        </p:txBody>
+      </p:sp>
       <p:pic>
         <p:nvPicPr>
-          <p:cNvPr id="10" name="Picture 9" descr="ArduinoDue_Front.jpg"/>
+          <p:cNvPr id="45" name="Picture 44" descr="electric car.jpg"/>
           <p:cNvPicPr>
             <a:picLocks noChangeAspect="1"/>
           </p:cNvPicPr>
@@ -4530,8 +4800,8 @@
         </p:blipFill>
         <p:spPr>
           <a:xfrm>
-            <a:off x="20373258" y="9944829"/>
-            <a:ext cx="8089900" cy="4114800"/>
+            <a:off x="15019108" y="9216959"/>
+            <a:ext cx="3819368" cy="2396615"/>
           </a:xfrm>
           <a:prstGeom prst="rect">
             <a:avLst/>
@@ -4540,14 +4810,319 @@
       </p:pic>
       <p:sp>
         <p:nvSpPr>
-          <p:cNvPr id="23" name="TextBox 22"/>
+          <p:cNvPr id="46" name="Up Arrow 45"/>
+          <p:cNvSpPr/>
+          <p:nvPr/>
+        </p:nvSpPr>
+        <p:spPr>
+          <a:xfrm>
+            <a:off x="16250005" y="7592656"/>
+            <a:ext cx="1318879" cy="1624303"/>
+          </a:xfrm>
+          <a:prstGeom prst="upArrow">
+            <a:avLst/>
+          </a:prstGeom>
+        </p:spPr>
+        <p:style>
+          <a:lnRef idx="1">
+            <a:schemeClr val="accent1"/>
+          </a:lnRef>
+          <a:fillRef idx="3">
+            <a:schemeClr val="accent1"/>
+          </a:fillRef>
+          <a:effectRef idx="2">
+            <a:schemeClr val="accent1"/>
+          </a:effectRef>
+          <a:fontRef idx="minor">
+            <a:schemeClr val="lt1"/>
+          </a:fontRef>
+        </p:style>
+        <p:txBody>
+          <a:bodyPr rtlCol="0" anchor="ctr"/>
+          <a:lstStyle/>
+          <a:p>
+            <a:pPr algn="ctr"/>
+            <a:endParaRPr lang="en-US"/>
+          </a:p>
+        </p:txBody>
+      </p:sp>
+      <p:sp>
+        <p:nvSpPr>
+          <p:cNvPr id="47" name="Alternate Process 46"/>
+          <p:cNvSpPr/>
+          <p:nvPr/>
+        </p:nvSpPr>
+        <p:spPr>
+          <a:xfrm>
+            <a:off x="15019108" y="5653488"/>
+            <a:ext cx="3376327" cy="1729322"/>
+          </a:xfrm>
+          <a:prstGeom prst="flowChartAlternateProcess">
+            <a:avLst/>
+          </a:prstGeom>
+        </p:spPr>
+        <p:style>
+          <a:lnRef idx="1">
+            <a:schemeClr val="accent1"/>
+          </a:lnRef>
+          <a:fillRef idx="3">
+            <a:schemeClr val="accent1"/>
+          </a:fillRef>
+          <a:effectRef idx="2">
+            <a:schemeClr val="accent1"/>
+          </a:effectRef>
+          <a:fontRef idx="minor">
+            <a:schemeClr val="lt1"/>
+          </a:fontRef>
+        </p:style>
+        <p:txBody>
+          <a:bodyPr rtlCol="0" anchor="ctr"/>
+          <a:lstStyle/>
+          <a:p>
+            <a:pPr algn="ctr"/>
+            <a:r>
+              <a:rPr lang="en-US" sz="3200" dirty="0" smtClean="0"/>
+              <a:t>CAN Transceivers</a:t>
+            </a:r>
+            <a:endParaRPr lang="en-US" sz="3200" dirty="0"/>
+          </a:p>
+        </p:txBody>
+      </p:sp>
+      <p:sp>
+        <p:nvSpPr>
+          <p:cNvPr id="48" name="Up Arrow 47"/>
+          <p:cNvSpPr/>
+          <p:nvPr/>
+        </p:nvSpPr>
+        <p:spPr>
+          <a:xfrm rot="5400000">
+            <a:off x="18692278" y="5650944"/>
+            <a:ext cx="1318878" cy="1624302"/>
+          </a:xfrm>
+          <a:prstGeom prst="upArrow">
+            <a:avLst/>
+          </a:prstGeom>
+        </p:spPr>
+        <p:style>
+          <a:lnRef idx="1">
+            <a:schemeClr val="accent1"/>
+          </a:lnRef>
+          <a:fillRef idx="3">
+            <a:schemeClr val="accent1"/>
+          </a:fillRef>
+          <a:effectRef idx="2">
+            <a:schemeClr val="accent1"/>
+          </a:effectRef>
+          <a:fontRef idx="minor">
+            <a:schemeClr val="lt1"/>
+          </a:fontRef>
+        </p:style>
+        <p:txBody>
+          <a:bodyPr rtlCol="0" anchor="ctr"/>
+          <a:lstStyle/>
+          <a:p>
+            <a:pPr algn="ctr"/>
+            <a:endParaRPr lang="en-US"/>
+          </a:p>
+        </p:txBody>
+      </p:sp>
+      <p:sp>
+        <p:nvSpPr>
+          <p:cNvPr id="52" name="Up Arrow 51"/>
+          <p:cNvSpPr/>
+          <p:nvPr/>
+        </p:nvSpPr>
+        <p:spPr>
+          <a:xfrm rot="10800000">
+            <a:off x="26540514" y="7594120"/>
+            <a:ext cx="1318879" cy="1624303"/>
+          </a:xfrm>
+          <a:prstGeom prst="upArrow">
+            <a:avLst/>
+          </a:prstGeom>
+        </p:spPr>
+        <p:style>
+          <a:lnRef idx="1">
+            <a:schemeClr val="accent1"/>
+          </a:lnRef>
+          <a:fillRef idx="3">
+            <a:schemeClr val="accent1"/>
+          </a:fillRef>
+          <a:effectRef idx="2">
+            <a:schemeClr val="accent1"/>
+          </a:effectRef>
+          <a:fontRef idx="minor">
+            <a:schemeClr val="lt1"/>
+          </a:fontRef>
+        </p:style>
+        <p:txBody>
+          <a:bodyPr rtlCol="0" anchor="ctr"/>
+          <a:lstStyle/>
+          <a:p>
+            <a:pPr algn="ctr"/>
+            <a:endParaRPr lang="en-US"/>
+          </a:p>
+        </p:txBody>
+      </p:sp>
+      <p:pic>
+        <p:nvPicPr>
+          <p:cNvPr id="53" name="Picture 52" descr="EV1.JPG"/>
+          <p:cNvPicPr>
+            <a:picLocks noChangeAspect="1"/>
+          </p:cNvPicPr>
+          <p:nvPr/>
+        </p:nvPicPr>
+        <p:blipFill rotWithShape="1">
+          <a:blip r:embed="rId10">
+            <a:extLst>
+              <a:ext uri="{28A0092B-C50C-407E-A947-70E740481C1C}">
+                <a14:useLocalDpi xmlns:a14="http://schemas.microsoft.com/office/drawing/2010/main" val="0"/>
+              </a:ext>
+            </a:extLst>
+          </a:blip>
+          <a:srcRect l="34578"/>
+          <a:stretch/>
+        </p:blipFill>
+        <p:spPr>
+          <a:xfrm rot="5400000">
+            <a:off x="25733373" y="9077779"/>
+            <a:ext cx="2972809" cy="3408032"/>
+          </a:xfrm>
+          <a:prstGeom prst="rect">
+            <a:avLst/>
+          </a:prstGeom>
+        </p:spPr>
+      </p:pic>
+      <p:sp>
+        <p:nvSpPr>
+          <p:cNvPr id="55" name="Up Arrow 54"/>
+          <p:cNvSpPr/>
+          <p:nvPr/>
+        </p:nvSpPr>
+        <p:spPr>
+          <a:xfrm rot="5400000">
+            <a:off x="23911912" y="5650944"/>
+            <a:ext cx="1318878" cy="1624302"/>
+          </a:xfrm>
+          <a:prstGeom prst="upArrow">
+            <a:avLst/>
+          </a:prstGeom>
+        </p:spPr>
+        <p:style>
+          <a:lnRef idx="1">
+            <a:schemeClr val="accent1"/>
+          </a:lnRef>
+          <a:fillRef idx="3">
+            <a:schemeClr val="accent1"/>
+          </a:fillRef>
+          <a:effectRef idx="2">
+            <a:schemeClr val="accent1"/>
+          </a:effectRef>
+          <a:fontRef idx="minor">
+            <a:schemeClr val="lt1"/>
+          </a:fontRef>
+        </p:style>
+        <p:txBody>
+          <a:bodyPr rtlCol="0" anchor="ctr"/>
+          <a:lstStyle/>
+          <a:p>
+            <a:pPr algn="ctr"/>
+            <a:endParaRPr lang="en-US"/>
+          </a:p>
+        </p:txBody>
+      </p:sp>
+      <p:sp>
+        <p:nvSpPr>
+          <p:cNvPr id="57" name="Alternate Process 56"/>
+          <p:cNvSpPr/>
+          <p:nvPr/>
+        </p:nvSpPr>
+        <p:spPr>
+          <a:xfrm>
+            <a:off x="20244722" y="5653488"/>
+            <a:ext cx="3376327" cy="1729322"/>
+          </a:xfrm>
+          <a:prstGeom prst="flowChartAlternateProcess">
+            <a:avLst/>
+          </a:prstGeom>
+        </p:spPr>
+        <p:style>
+          <a:lnRef idx="1">
+            <a:schemeClr val="accent1"/>
+          </a:lnRef>
+          <a:fillRef idx="3">
+            <a:schemeClr val="accent1"/>
+          </a:fillRef>
+          <a:effectRef idx="2">
+            <a:schemeClr val="accent1"/>
+          </a:effectRef>
+          <a:fontRef idx="minor">
+            <a:schemeClr val="lt1"/>
+          </a:fontRef>
+        </p:style>
+        <p:txBody>
+          <a:bodyPr rtlCol="0" anchor="ctr"/>
+          <a:lstStyle/>
+          <a:p>
+            <a:pPr algn="ctr"/>
+            <a:r>
+              <a:rPr lang="en-US" sz="3200" dirty="0" smtClean="0"/>
+              <a:t>Microprocessor</a:t>
+            </a:r>
+          </a:p>
+        </p:txBody>
+      </p:sp>
+      <p:sp>
+        <p:nvSpPr>
+          <p:cNvPr id="58" name="Alternate Process 57"/>
+          <p:cNvSpPr/>
+          <p:nvPr/>
+        </p:nvSpPr>
+        <p:spPr>
+          <a:xfrm>
+            <a:off x="25464701" y="5722645"/>
+            <a:ext cx="3376327" cy="1729322"/>
+          </a:xfrm>
+          <a:prstGeom prst="flowChartAlternateProcess">
+            <a:avLst/>
+          </a:prstGeom>
+        </p:spPr>
+        <p:style>
+          <a:lnRef idx="1">
+            <a:schemeClr val="accent1"/>
+          </a:lnRef>
+          <a:fillRef idx="3">
+            <a:schemeClr val="accent1"/>
+          </a:fillRef>
+          <a:effectRef idx="2">
+            <a:schemeClr val="accent1"/>
+          </a:effectRef>
+          <a:fontRef idx="minor">
+            <a:schemeClr val="lt1"/>
+          </a:fontRef>
+        </p:style>
+        <p:txBody>
+          <a:bodyPr rtlCol="0" anchor="ctr"/>
+          <a:lstStyle/>
+          <a:p>
+            <a:pPr algn="ctr"/>
+            <a:r>
+              <a:rPr lang="en-US" sz="3200" dirty="0" smtClean="0"/>
+              <a:t>Screen</a:t>
+            </a:r>
+          </a:p>
+        </p:txBody>
+      </p:sp>
+      <p:sp>
+        <p:nvSpPr>
+          <p:cNvPr id="59" name="TextBox 58"/>
           <p:cNvSpPr txBox="1"/>
           <p:nvPr/>
         </p:nvSpPr>
         <p:spPr>
           <a:xfrm>
-            <a:off x="14874134" y="5443046"/>
-            <a:ext cx="6907908" cy="5262979"/>
+            <a:off x="15332406" y="25751135"/>
+            <a:ext cx="13130753" cy="1569660"/>
           </a:xfrm>
           <a:prstGeom prst="rect">
             <a:avLst/>
@@ -4560,79 +5135,24 @@
           </a:bodyPr>
           <a:lstStyle/>
           <a:p>
-            <a:pPr algn="just"/>
             <a:r>
               <a:rPr lang="en-US" sz="2400" dirty="0" smtClean="0"/>
-              <a:t>The real estate that the digital dash unit took up on the physical dash needed to be minimal. This requirement dictated two large design choices:</a:t>
-            </a:r>
-          </a:p>
-          <a:p>
-            <a:pPr marL="342900" indent="-342900" algn="just">
-              <a:buFont typeface="Arial"/>
-              <a:buChar char="•"/>
-            </a:pPr>
-            <a:r>
-              <a:rPr lang="en-US" sz="2400" dirty="0" smtClean="0"/>
-              <a:t>The 3.5” Display Size</a:t>
-            </a:r>
-          </a:p>
-          <a:p>
-            <a:pPr marL="342900" indent="-342900" algn="just">
-              <a:buFont typeface="Arial"/>
-              <a:buChar char="•"/>
-            </a:pPr>
-            <a:r>
-              <a:rPr lang="en-US" sz="2400" dirty="0" smtClean="0"/>
-              <a:t>The custom PCB to cut down size</a:t>
-            </a:r>
-          </a:p>
-          <a:p>
-            <a:pPr marL="342900" indent="-342900" algn="just">
-              <a:buFont typeface="Arial"/>
-              <a:buChar char="•"/>
-            </a:pPr>
+              <a:t>The 4D Systems screen came with a useful piece of software to aide the quick creation of GUIs. The screen receives values from the mainboard through a serial connection. The GUI was created to be simple and intuitive. The designed GUI also utilizes the resistive touch capability of the screen in order to flip through a couple different submenus that include further information that a driver might want.</a:t>
+            </a:r>
             <a:endParaRPr lang="en-US" sz="2400" dirty="0"/>
           </a:p>
-          <a:p>
-            <a:pPr algn="just"/>
-            <a:r>
-              <a:rPr lang="en-US" sz="2400" dirty="0" smtClean="0"/>
-              <a:t>The entire system was first prototyped using an </a:t>
-            </a:r>
-            <a:r>
-              <a:rPr lang="en-US" sz="2400" dirty="0" err="1" smtClean="0"/>
-              <a:t>Arduino</a:t>
-            </a:r>
-            <a:r>
-              <a:rPr lang="en-US" sz="2400" dirty="0" smtClean="0"/>
-              <a:t> Due which was slightly too large for the solution we had in mind. The screen was slightly smaller than the LCD and the </a:t>
-            </a:r>
-            <a:r>
-              <a:rPr lang="en-US" sz="2400" dirty="0" err="1" smtClean="0"/>
-              <a:t>Arduino</a:t>
-            </a:r>
-            <a:r>
-              <a:rPr lang="en-US" sz="2400" dirty="0" smtClean="0"/>
-              <a:t> Due would have a lot of wires plugging into the screen. We wanted our device to be as plug-and-play as possible so we created a custom PCB that would plug directly into the LCD with no “</a:t>
-            </a:r>
-            <a:r>
-              <a:rPr lang="en-US" sz="2400" smtClean="0"/>
-              <a:t>mod wires”.</a:t>
-            </a:r>
-            <a:endParaRPr lang="en-US" sz="2400" dirty="0"/>
-          </a:p>
-        </p:txBody>
-      </p:sp>
-      <p:sp>
-        <p:nvSpPr>
-          <p:cNvPr id="12" name="TextBox 11"/>
+        </p:txBody>
+      </p:sp>
+      <p:sp>
+        <p:nvSpPr>
+          <p:cNvPr id="33" name="TextBox 32"/>
           <p:cNvSpPr txBox="1"/>
           <p:nvPr/>
         </p:nvSpPr>
         <p:spPr>
           <a:xfrm>
-            <a:off x="30623080" y="16109421"/>
-            <a:ext cx="7585430" cy="461665"/>
+            <a:off x="1034454" y="15451557"/>
+            <a:ext cx="6115075" cy="830997"/>
           </a:xfrm>
           <a:prstGeom prst="rect">
             <a:avLst/>
@@ -4647,11 +5167,17 @@
           <a:p>
             <a:r>
               <a:rPr lang="en-US" sz="2400" dirty="0" smtClean="0"/>
-              <a:t>The digital dash can be installed on the VMS </a:t>
-            </a:r>
-            <a:r>
-              <a:rPr lang="en-US" sz="2400" smtClean="0"/>
-              <a:t>car if it works.</a:t>
+              <a:t>Currently there is no commercially ready digital</a:t>
+            </a:r>
+          </a:p>
+          <a:p>
+            <a:r>
+              <a:rPr lang="en-US" sz="2400" dirty="0"/>
+              <a:t>d</a:t>
+            </a:r>
+            <a:r>
+              <a:rPr lang="en-US" sz="2400" dirty="0" smtClean="0"/>
+              <a:t>ash unit </a:t>
             </a:r>
             <a:endParaRPr lang="en-US" sz="2400" dirty="0"/>
           </a:p>

</xml_diff>